<commit_message>
UPD: corrections after paper revision #1
</commit_message>
<xml_diff>
--- a/docs/presentation.pptx
+++ b/docs/presentation.pptx
@@ -3749,7 +3749,7 @@
             </a:r>
             <a:r>
               <a:rPr lang="ru-RU" dirty="0"/>
-              <a:t> работы является разработка база данных для транспортной системы завода и </a:t>
+              <a:t> работы является разработка базы данных для транспортной системы завода и </a:t>
             </a:r>
             <a:r>
               <a:rPr lang="en-US" dirty="0"/>
@@ -4019,7 +4019,7 @@
             <p:ph idx="1"/>
             <p:extLst>
               <p:ext uri="{D42A27DB-BD31-4B8C-83A1-F6EECF244321}">
-                <p14:modId xmlns:p14="http://schemas.microsoft.com/office/powerpoint/2010/main" val="2286977738"/>
+                <p14:modId xmlns:p14="http://schemas.microsoft.com/office/powerpoint/2010/main" val="2926726804"/>
               </p:ext>
             </p:extLst>
           </p:nvPr>
@@ -4187,7 +4187,7 @@
                     <a:p>
                       <a:r>
                         <a:rPr lang="ru-RU" sz="2600" dirty="0"/>
-                        <a:t>Выбор заказа, выполнение заказа, просмотр личной информации</a:t>
+                        <a:t>Выбор заказа, выполнение заказа, просмотр дежурств и личной информации</a:t>
                       </a:r>
                     </a:p>
                   </a:txBody>
@@ -4240,7 +4240,7 @@
                     <a:p>
                       <a:r>
                         <a:rPr lang="ru-RU" sz="2600" dirty="0"/>
-                        <a:t>Создание записей о проезде, просмотр личной информации</a:t>
+                        <a:t>Создание записей о проезде, просмотр дежурств и личной информации</a:t>
                       </a:r>
                     </a:p>
                   </a:txBody>
@@ -4636,14 +4636,14 @@
           <p:nvPr>
             <p:extLst>
               <p:ext uri="{D42A27DB-BD31-4B8C-83A1-F6EECF244321}">
-                <p14:modId xmlns:p14="http://schemas.microsoft.com/office/powerpoint/2010/main" val="4045282728"/>
+                <p14:modId xmlns:p14="http://schemas.microsoft.com/office/powerpoint/2010/main" val="4221759589"/>
               </p:ext>
             </p:extLst>
           </p:nvPr>
         </p:nvGraphicFramePr>
         <p:xfrm>
-          <a:off x="838201" y="1055604"/>
-          <a:ext cx="10515599" cy="5730240"/>
+          <a:off x="690881" y="1055604"/>
+          <a:ext cx="10922000" cy="5730240"/>
         </p:xfrm>
         <a:graphic>
           <a:graphicData uri="http://schemas.openxmlformats.org/drawingml/2006/table">
@@ -4652,21 +4652,21 @@
                 <a:tableStyleId>{B301B821-A1FF-4177-AEE7-76D212191A09}</a:tableStyleId>
               </a:tblPr>
               <a:tblGrid>
-                <a:gridCol w="2983028">
+                <a:gridCol w="3098315">
                   <a:extLst>
                     <a:ext uri="{9D8B030D-6E8A-4147-A177-3AD203B41FA5}">
                       <a16:colId xmlns:a16="http://schemas.microsoft.com/office/drawing/2014/main" val="1645561112"/>
                     </a:ext>
                   </a:extLst>
                 </a:gridCol>
-                <a:gridCol w="1828800">
+                <a:gridCol w="1899478">
                   <a:extLst>
                     <a:ext uri="{9D8B030D-6E8A-4147-A177-3AD203B41FA5}">
                       <a16:colId xmlns:a16="http://schemas.microsoft.com/office/drawing/2014/main" val="3487028448"/>
                     </a:ext>
                   </a:extLst>
                 </a:gridCol>
-                <a:gridCol w="5703771">
+                <a:gridCol w="5924207">
                   <a:extLst>
                     <a:ext uri="{9D8B030D-6E8A-4147-A177-3AD203B41FA5}">
                       <a16:colId xmlns:a16="http://schemas.microsoft.com/office/drawing/2014/main" val="2790307164"/>
@@ -5007,8 +5007,13 @@
                       </a:pPr>
                       <a:r>
                         <a:rPr lang="ru-RU" sz="2400" dirty="0"/>
-                        <a:t>Большое количество </a:t>
+                        <a:t>Большое количество фреймворков и </a:t>
                       </a:r>
+                      <a:r>
+                        <a:rPr lang="en-US" sz="2400" dirty="0"/>
+                        <a:t>ORM</a:t>
+                      </a:r>
+                      <a:endParaRPr lang="ru-RU" sz="2400" dirty="0"/>
                     </a:p>
                   </a:txBody>
                   <a:tcPr>
@@ -5259,7 +5264,7 @@
         </p:nvSpPr>
         <p:spPr>
           <a:xfrm>
-            <a:off x="535806" y="5709312"/>
+            <a:off x="535806" y="5353712"/>
             <a:ext cx="10817994" cy="1062695"/>
           </a:xfrm>
         </p:spPr>
@@ -5309,14 +5314,14 @@
           <p:nvPr>
             <p:extLst>
               <p:ext uri="{D42A27DB-BD31-4B8C-83A1-F6EECF244321}">
-                <p14:modId xmlns:p14="http://schemas.microsoft.com/office/powerpoint/2010/main" val="3067810302"/>
+                <p14:modId xmlns:p14="http://schemas.microsoft.com/office/powerpoint/2010/main" val="373545305"/>
               </p:ext>
             </p:extLst>
           </p:nvPr>
         </p:nvGraphicFramePr>
         <p:xfrm>
           <a:off x="535806" y="1148687"/>
-          <a:ext cx="10817994" cy="4071102"/>
+          <a:ext cx="10817994" cy="3806038"/>
         </p:xfrm>
         <a:graphic>
           <a:graphicData uri="http://schemas.openxmlformats.org/drawingml/2006/table">
@@ -5347,7 +5352,7 @@
                   </a:extLst>
                 </a:gridCol>
               </a:tblGrid>
-              <a:tr h="490572">
+              <a:tr h="520955">
                 <a:tc>
                   <a:txBody>
                     <a:bodyPr/>
@@ -5432,7 +5437,7 @@
                   </a:ext>
                 </a:extLst>
               </a:tr>
-              <a:tr h="929504">
+              <a:tr h="987072">
                 <a:tc>
                   <a:txBody>
                     <a:bodyPr/>
@@ -5547,7 +5552,7 @@
                   </a:ext>
                 </a:extLst>
               </a:tr>
-              <a:tr h="1213519">
+              <a:tr h="1032358">
                 <a:tc>
                   <a:txBody>
                     <a:bodyPr/>
@@ -5584,16 +5589,6 @@
                       <a:r>
                         <a:rPr lang="ru-RU" sz="2200" dirty="0"/>
                         <a:t>Простота в использовании</a:t>
-                      </a:r>
-                    </a:p>
-                    <a:p>
-                      <a:pPr marL="342900" indent="-342900">
-                        <a:buFont typeface="Calibri" panose="020F0502020204030204" pitchFamily="34" charset="0"/>
-                        <a:buChar char="+"/>
-                      </a:pPr>
-                      <a:r>
-                        <a:rPr lang="ru-RU" sz="2200" dirty="0"/>
-                        <a:t>Надёжность</a:t>
                       </a:r>
                     </a:p>
                     <a:p>
@@ -5677,7 +5672,7 @@
                   </a:ext>
                 </a:extLst>
               </a:tr>
-              <a:tr h="1181183">
+              <a:tr h="1004849">
                 <a:tc>
                   <a:txBody>
                     <a:bodyPr/>
@@ -5891,7 +5886,7 @@
         <p:spPr/>
         <p:txBody>
           <a:bodyPr>
-            <a:normAutofit fontScale="92500"/>
+            <a:normAutofit/>
           </a:bodyPr>
           <a:lstStyle/>
           <a:p>
@@ -6009,18 +6004,8 @@
               <a:t>web</a:t>
             </a:r>
             <a:r>
-              <a:rPr lang="ru-RU"/>
-              <a:t>-приложение </a:t>
-            </a:r>
-            <a:r>
               <a:rPr lang="ru-RU" dirty="0"/>
-              <a:t>для создания графического интерфейса для работы с данными.</a:t>
-            </a:r>
-          </a:p>
-          <a:p>
-            <a:r>
-              <a:rPr lang="ru-RU" dirty="0"/>
-              <a:t>Реализованное приложение позволяет потенциальным сотрудникам завода удобно просматривать и изменять компоненты транспортной системы, в соответствии со своими обязанностями.</a:t>
+              <a:t>-приложение для создания графического интерфейса для работы с данными.</a:t>
             </a:r>
           </a:p>
         </p:txBody>

</xml_diff>